<commit_message>
Update documents status to 'Complete'
</commit_message>
<xml_diff>
--- a/Courses/Software-Sciences/Module-3-Databases/14-Connection-Between-C#-and-Database/14-Connection-Between-C#-and-Database.pptx
+++ b/Courses/Software-Sciences/Module-3-Databases/14-Connection-Between-C#-and-Database/14-Connection-Between-C#-and-Database.pptx
@@ -482,7 +482,7 @@
           <a:p>
             <a:fld id="{4E087215-0C8F-4762-A664-737A353EC9A4}" type="datetimeFigureOut">
               <a:rPr lang="bg-BG" smtClean="0"/>
-              <a:t>18.4.2024 г.</a:t>
+              <a:t>17.9.2024 г.</a:t>
             </a:fld>
             <a:endParaRPr lang="bg-BG"/>
           </a:p>
@@ -678,7 +678,7 @@
           <a:p>
             <a:fld id="{72D84649-876A-46C9-8472-14CB09C070D8}" type="datetimeFigureOut">
               <a:rPr lang="en-US" smtClean="0"/>
-              <a:t>4/18/2024</a:t>
+              <a:t>9/17/2024</a:t>
             </a:fld>
             <a:endParaRPr lang="en-US"/>
           </a:p>
@@ -7941,10 +7941,10 @@
       </p:pic>
       <p:pic>
         <p:nvPicPr>
-          <p:cNvPr id="4" name="Picture 3" descr="A yellow and blue sign with white text&#10;&#10;Description automatically generated">
+          <p:cNvPr id="2" name="Picture 1">
             <a:extLst>
               <a:ext uri="{FF2B5EF4-FFF2-40B4-BE49-F238E27FC236}">
-                <a16:creationId xmlns:a16="http://schemas.microsoft.com/office/drawing/2014/main" id="{48FEE97A-49AD-4CBD-8140-F9AC020C6BD5}"/>
+                <a16:creationId xmlns:a16="http://schemas.microsoft.com/office/drawing/2014/main" id="{C338E39B-094F-25FA-FB2E-545F59F8F1D4}"/>
               </a:ext>
             </a:extLst>
           </p:cNvPr>
@@ -7954,7 +7954,7 @@
           <p:nvPr/>
         </p:nvPicPr>
         <p:blipFill>
-          <a:blip r:embed="rId5">
+          <a:blip r:embed="rId5" cstate="print">
             <a:extLst>
               <a:ext uri="{28A0092B-C50C-407E-A947-70E740481C1C}">
                 <a14:useLocalDpi xmlns:a14="http://schemas.microsoft.com/office/drawing/2010/main" val="0"/>
@@ -7965,14 +7965,18 @@
             <a:fillRect/>
           </a:stretch>
         </p:blipFill>
-        <p:spPr>
+        <p:spPr bwMode="auto">
           <a:xfrm>
-            <a:off x="584311" y="3001428"/>
-            <a:ext cx="1956689" cy="877572"/>
+            <a:off x="534045" y="2940232"/>
+            <a:ext cx="2185144" cy="977536"/>
           </a:xfrm>
           <a:prstGeom prst="rect">
             <a:avLst/>
           </a:prstGeom>
+          <a:noFill/>
+          <a:ln>
+            <a:noFill/>
+          </a:ln>
         </p:spPr>
       </p:pic>
     </p:spTree>

</xml_diff>